<commit_message>
Fixed dates on NeXT GEN
</commit_message>
<xml_diff>
--- a/translations/en-us/fll/GlobalInnovationAward.pptx
+++ b/translations/en-us/fll/GlobalInnovationAward.pptx
@@ -163,7 +163,7 @@
           <p:cNvPr id="2" name="Header Placeholder 1">
             <a:extLst>
               <a:ext uri="{FF2B5EF4-FFF2-40B4-BE49-F238E27FC236}">
-                <a16:creationId xmlns:a16="http://schemas.microsoft.com/office/drawing/2014/main" xmlns="" id="{5C361B30-4453-46D4-8089-125B564D0555}"/>
+                <a16:creationId xmlns="" xmlns:a16="http://schemas.microsoft.com/office/drawing/2014/main" id="{5C361B30-4453-46D4-8089-125B564D0555}"/>
               </a:ext>
             </a:extLst>
           </p:cNvPr>
@@ -200,7 +200,7 @@
           <p:cNvPr id="3" name="Date Placeholder 2">
             <a:extLst>
               <a:ext uri="{FF2B5EF4-FFF2-40B4-BE49-F238E27FC236}">
-                <a16:creationId xmlns:a16="http://schemas.microsoft.com/office/drawing/2014/main" xmlns="" id="{BEEE4564-61F9-48F7-A867-CCA5D38885FA}"/>
+                <a16:creationId xmlns="" xmlns:a16="http://schemas.microsoft.com/office/drawing/2014/main" id="{BEEE4564-61F9-48F7-A867-CCA5D38885FA}"/>
               </a:ext>
             </a:extLst>
           </p:cNvPr>
@@ -230,7 +230,7 @@
           <a:p>
             <a:fld id="{B5F92CFC-E422-40B4-9CC4-DEA280552AB2}" type="datetimeFigureOut">
               <a:rPr lang="en-US" smtClean="0"/>
-              <a:t>8/25/17</a:t>
+              <a:t>8/26/17</a:t>
             </a:fld>
             <a:endParaRPr lang="en-US"/>
           </a:p>
@@ -241,7 +241,7 @@
           <p:cNvPr id="4" name="Footer Placeholder 3">
             <a:extLst>
               <a:ext uri="{FF2B5EF4-FFF2-40B4-BE49-F238E27FC236}">
-                <a16:creationId xmlns:a16="http://schemas.microsoft.com/office/drawing/2014/main" xmlns="" id="{74AB1315-599A-4D81-852D-E668C7B07DD6}"/>
+                <a16:creationId xmlns="" xmlns:a16="http://schemas.microsoft.com/office/drawing/2014/main" id="{74AB1315-599A-4D81-852D-E668C7B07DD6}"/>
               </a:ext>
             </a:extLst>
           </p:cNvPr>
@@ -278,7 +278,7 @@
           <p:cNvPr id="5" name="Slide Number Placeholder 4">
             <a:extLst>
               <a:ext uri="{FF2B5EF4-FFF2-40B4-BE49-F238E27FC236}">
-                <a16:creationId xmlns:a16="http://schemas.microsoft.com/office/drawing/2014/main" xmlns="" id="{17BB853C-FFB3-4CD8-9103-CEFF2E6F933C}"/>
+                <a16:creationId xmlns="" xmlns:a16="http://schemas.microsoft.com/office/drawing/2014/main" id="{17BB853C-FFB3-4CD8-9103-CEFF2E6F933C}"/>
               </a:ext>
             </a:extLst>
           </p:cNvPr>
@@ -407,7 +407,7 @@
           <a:p>
             <a:fld id="{A78B980B-A051-5042-A199-B77431CF73D3}" type="datetimeFigureOut">
               <a:rPr lang="en-US" smtClean="0"/>
-              <a:t>8/25/17</a:t>
+              <a:t>8/26/17</a:t>
             </a:fld>
             <a:endParaRPr lang="en-US"/>
           </a:p>
@@ -977,9 +977,9 @@
           <a:bodyPr/>
           <a:lstStyle/>
           <a:p>
-            <a:fld id="{FF3C776A-E81E-8C4B-AD61-4288CABCE1E0}" type="datetime1">
+            <a:fld id="{B78C3510-F136-EF4F-97FF-4A90A54CF171}" type="datetime1">
               <a:rPr lang="en-US" smtClean="0"/>
-              <a:t>8/25/17</a:t>
+              <a:t>8/26/17</a:t>
             </a:fld>
             <a:endParaRPr lang="en-US" dirty="0"/>
           </a:p>
@@ -1002,7 +1002,7 @@
           <a:p>
             <a:r>
               <a:rPr lang="en-US" smtClean="0"/>
-              <a:t>Copyright 2017, EV3Lessons.com (Last Edit 8/24/2017)</a:t>
+              <a:t>Copyright 2017, EV3Lessons.com (Last Edit 8/26/2017)</a:t>
             </a:r>
             <a:endParaRPr lang="en-US" dirty="0"/>
           </a:p>
@@ -1531,9 +1531,9 @@
           <a:bodyPr/>
           <a:lstStyle/>
           <a:p>
-            <a:fld id="{8E150F9C-C68E-D24D-A630-BD93230BB6FF}" type="datetime1">
+            <a:fld id="{D7535631-3C47-2940-A869-4E1C8DF2163F}" type="datetime1">
               <a:rPr lang="en-US" smtClean="0"/>
-              <a:t>8/25/17</a:t>
+              <a:t>8/26/17</a:t>
             </a:fld>
             <a:endParaRPr lang="en-US" dirty="0"/>
           </a:p>
@@ -1556,7 +1556,7 @@
           <a:p>
             <a:r>
               <a:rPr lang="en-US" smtClean="0"/>
-              <a:t>Copyright 2017, EV3Lessons.com (Last Edit 8/24/2017)</a:t>
+              <a:t>Copyright 2017, EV3Lessons.com (Last Edit 8/26/2017)</a:t>
             </a:r>
             <a:endParaRPr lang="en-US" dirty="0"/>
           </a:p>
@@ -1786,9 +1786,9 @@
           <a:bodyPr/>
           <a:lstStyle/>
           <a:p>
-            <a:fld id="{4AF1BA53-9060-1B47-8FFC-3A9452B73344}" type="datetime1">
+            <a:fld id="{65DB7B8C-078C-5345-BD42-663A96D91347}" type="datetime1">
               <a:rPr lang="en-US" smtClean="0"/>
-              <a:t>8/25/17</a:t>
+              <a:t>8/26/17</a:t>
             </a:fld>
             <a:endParaRPr lang="en-US" dirty="0"/>
           </a:p>
@@ -1811,7 +1811,7 @@
           <a:p>
             <a:r>
               <a:rPr lang="en-US" smtClean="0"/>
-              <a:t>Copyright 2017, EV3Lessons.com (Last Edit 8/24/2017)</a:t>
+              <a:t>Copyright 2017, EV3Lessons.com (Last Edit 8/26/2017)</a:t>
             </a:r>
             <a:endParaRPr lang="en-US" dirty="0"/>
           </a:p>
@@ -1955,9 +1955,9 @@
           <a:bodyPr/>
           <a:lstStyle/>
           <a:p>
-            <a:fld id="{FC9FD355-C023-C143-AB12-425B954F6C7E}" type="datetime1">
+            <a:fld id="{7C339093-107C-5640-9BF0-A05D24D4DEC4}" type="datetime1">
               <a:rPr lang="en-US" smtClean="0"/>
-              <a:t>8/25/17</a:t>
+              <a:t>8/26/17</a:t>
             </a:fld>
             <a:endParaRPr lang="en-US" dirty="0"/>
           </a:p>
@@ -1980,7 +1980,7 @@
           <a:p>
             <a:r>
               <a:rPr lang="en-US" smtClean="0"/>
-              <a:t>Copyright 2017, EV3Lessons.com (Last Edit 8/24/2017)</a:t>
+              <a:t>Copyright 2017, EV3Lessons.com (Last Edit 8/26/2017)</a:t>
             </a:r>
             <a:endParaRPr lang="en-US" dirty="0"/>
           </a:p>
@@ -2297,9 +2297,9 @@
           <a:bodyPr/>
           <a:lstStyle/>
           <a:p>
-            <a:fld id="{0AD0C401-046C-DE41-A49F-4D90CD973141}" type="datetime1">
+            <a:fld id="{D7147C8C-7628-D440-8BEB-A9D615FEFC5E}" type="datetime1">
               <a:rPr lang="en-US" smtClean="0"/>
-              <a:t>8/25/17</a:t>
+              <a:t>8/26/17</a:t>
             </a:fld>
             <a:endParaRPr lang="en-US" dirty="0"/>
           </a:p>
@@ -2322,7 +2322,7 @@
           <a:p>
             <a:r>
               <a:rPr lang="en-US" smtClean="0"/>
-              <a:t>Copyright 2017, EV3Lessons.com (Last Edit 8/24/2017)</a:t>
+              <a:t>Copyright 2017, EV3Lessons.com (Last Edit 8/26/2017)</a:t>
             </a:r>
             <a:endParaRPr lang="en-US" dirty="0"/>
           </a:p>
@@ -2616,9 +2616,9 @@
           <a:bodyPr/>
           <a:lstStyle/>
           <a:p>
-            <a:fld id="{6B88AB5C-1198-D64C-A39B-626C3E295F06}" type="datetime1">
+            <a:fld id="{1056270D-4110-BF4E-8D2C-54376E298126}" type="datetime1">
               <a:rPr lang="en-US" smtClean="0"/>
-              <a:t>8/25/17</a:t>
+              <a:t>8/26/17</a:t>
             </a:fld>
             <a:endParaRPr lang="en-US" dirty="0"/>
           </a:p>
@@ -2641,7 +2641,7 @@
           <a:p>
             <a:r>
               <a:rPr lang="en-US" smtClean="0"/>
-              <a:t>Copyright 2017, EV3Lessons.com (Last Edit 8/24/2017)</a:t>
+              <a:t>Copyright 2017, EV3Lessons.com (Last Edit 8/26/2017)</a:t>
             </a:r>
             <a:endParaRPr lang="en-US" dirty="0"/>
           </a:p>
@@ -2994,9 +2994,9 @@
           <a:bodyPr/>
           <a:lstStyle/>
           <a:p>
-            <a:fld id="{2F99EBFB-79FE-664B-B7D9-BA9E684EDBDD}" type="datetime1">
+            <a:fld id="{6D9F51B0-2A22-8A4A-B30F-5B1ED351A0BF}" type="datetime1">
               <a:rPr lang="en-US" smtClean="0"/>
-              <a:t>8/25/17</a:t>
+              <a:t>8/26/17</a:t>
             </a:fld>
             <a:endParaRPr lang="en-US" dirty="0"/>
           </a:p>
@@ -3019,7 +3019,7 @@
           <a:p>
             <a:r>
               <a:rPr lang="en-US" smtClean="0"/>
-              <a:t>Copyright 2017, EV3Lessons.com (Last Edit 8/24/2017)</a:t>
+              <a:t>Copyright 2017, EV3Lessons.com (Last Edit 8/26/2017)</a:t>
             </a:r>
             <a:endParaRPr lang="en-US" dirty="0"/>
           </a:p>
@@ -3111,9 +3111,9 @@
           <a:bodyPr/>
           <a:lstStyle/>
           <a:p>
-            <a:fld id="{3768128D-ED08-584D-9F7E-7D8B96825E2D}" type="datetime1">
+            <a:fld id="{784CDDD9-C3E4-5A4E-9FD9-395073559F67}" type="datetime1">
               <a:rPr lang="en-US" smtClean="0"/>
-              <a:t>8/25/17</a:t>
+              <a:t>8/26/17</a:t>
             </a:fld>
             <a:endParaRPr lang="en-US" dirty="0"/>
           </a:p>
@@ -3136,7 +3136,7 @@
           <a:p>
             <a:r>
               <a:rPr lang="en-US" smtClean="0"/>
-              <a:t>Copyright 2017, EV3Lessons.com (Last Edit 8/24/2017)</a:t>
+              <a:t>Copyright 2017, EV3Lessons.com (Last Edit 8/26/2017)</a:t>
             </a:r>
             <a:endParaRPr lang="en-US" dirty="0"/>
           </a:p>
@@ -3281,9 +3281,9 @@
           <a:bodyPr/>
           <a:lstStyle/>
           <a:p>
-            <a:fld id="{13E9F244-6F0C-5249-B95A-46D0353F5ACB}" type="datetime1">
+            <a:fld id="{CDC628E9-03C2-1F42-92D5-9F73A33F2133}" type="datetime1">
               <a:rPr lang="en-US" smtClean="0"/>
-              <a:t>8/25/17</a:t>
+              <a:t>8/26/17</a:t>
             </a:fld>
             <a:endParaRPr lang="en-US" dirty="0"/>
           </a:p>
@@ -3314,7 +3314,7 @@
           <a:p>
             <a:r>
               <a:rPr lang="en-US" smtClean="0"/>
-              <a:t>Copyright 2017, EV3Lessons.com (Last Edit 8/24/2017)</a:t>
+              <a:t>Copyright 2017, EV3Lessons.com (Last Edit 8/26/2017)</a:t>
             </a:r>
             <a:endParaRPr lang="en-US" dirty="0"/>
           </a:p>
@@ -3634,9 +3634,9 @@
             </a:lvl1pPr>
           </a:lstStyle>
           <a:p>
-            <a:fld id="{566B9D5A-9CDE-6043-9099-DB1AAFE7BCA1}" type="datetime1">
+            <a:fld id="{0618C966-F3B9-044A-AD2F-C1A96419628D}" type="datetime1">
               <a:rPr lang="en-US" smtClean="0"/>
-              <a:t>8/25/17</a:t>
+              <a:t>8/26/17</a:t>
             </a:fld>
             <a:endParaRPr lang="en-US" dirty="0"/>
           </a:p>
@@ -3672,7 +3672,7 @@
           <a:p>
             <a:r>
               <a:rPr lang="en-US" smtClean="0"/>
-              <a:t>Copyright 2017, EV3Lessons.com (Last Edit 8/24/2017)</a:t>
+              <a:t>Copyright 2017, EV3Lessons.com (Last Edit 8/26/2017)</a:t>
             </a:r>
             <a:endParaRPr lang="en-US" dirty="0"/>
           </a:p>
@@ -4012,9 +4012,9 @@
           <a:bodyPr/>
           <a:lstStyle/>
           <a:p>
-            <a:fld id="{D3504A65-818E-BE4F-BE9A-BEEB9D6C7993}" type="datetime1">
+            <a:fld id="{F3F1E5CC-92D4-B440-B96C-2ED7C16A2814}" type="datetime1">
               <a:rPr lang="en-US" smtClean="0"/>
-              <a:t>8/25/17</a:t>
+              <a:t>8/26/17</a:t>
             </a:fld>
             <a:endParaRPr lang="en-US" dirty="0"/>
           </a:p>
@@ -4037,7 +4037,7 @@
           <a:p>
             <a:r>
               <a:rPr lang="en-US" smtClean="0"/>
-              <a:t>Copyright 2017, EV3Lessons.com (Last Edit 8/24/2017)</a:t>
+              <a:t>Copyright 2017, EV3Lessons.com (Last Edit 8/26/2017)</a:t>
             </a:r>
             <a:endParaRPr lang="en-US" dirty="0"/>
           </a:p>
@@ -4298,9 +4298,9 @@
             </a:lvl1pPr>
           </a:lstStyle>
           <a:p>
-            <a:fld id="{0F950A47-FE3F-074D-8750-397048D29164}" type="datetime1">
+            <a:fld id="{91D11AA8-EBCD-B140-8DB0-BA7611CCF548}" type="datetime1">
               <a:rPr lang="en-US" smtClean="0"/>
-              <a:t>8/25/17</a:t>
+              <a:t>8/26/17</a:t>
             </a:fld>
             <a:endParaRPr lang="en-US" dirty="0"/>
           </a:p>
@@ -4339,7 +4339,7 @@
           <a:p>
             <a:r>
               <a:rPr lang="en-US" smtClean="0"/>
-              <a:t>Copyright 2017, EV3Lessons.com (Last Edit 8/24/2017)</a:t>
+              <a:t>Copyright 2017, EV3Lessons.com (Last Edit 8/26/2017)</a:t>
             </a:r>
             <a:endParaRPr lang="en-US" dirty="0"/>
           </a:p>
@@ -4898,11 +4898,7 @@
             </a:r>
             <a:r>
               <a:rPr lang="en-US" dirty="0" smtClean="0"/>
-              <a:t>Award </a:t>
-            </a:r>
-            <a:r>
-              <a:rPr lang="en-US" dirty="0" smtClean="0"/>
-              <a:t>(GIA)</a:t>
+              <a:t>Award (GIA)</a:t>
             </a:r>
             <a:endParaRPr lang="en-US" dirty="0"/>
           </a:p>
@@ -4963,7 +4959,7 @@
           <a:p>
             <a:r>
               <a:rPr lang="en-US" smtClean="0"/>
-              <a:t>Copyright 2017, EV3Lessons.com (Last Edit 8/24/2017)</a:t>
+              <a:t>Copyright 2017, EV3Lessons.com (Last Edit 8/26/2017)</a:t>
             </a:r>
             <a:endParaRPr lang="en-US" dirty="0"/>
           </a:p>
@@ -4997,7 +4993,7 @@
           <p:cNvPr id="8" name="Picture 7">
             <a:extLst>
               <a:ext uri="{FF2B5EF4-FFF2-40B4-BE49-F238E27FC236}">
-                <a16:creationId xmlns:a16="http://schemas.microsoft.com/office/drawing/2014/main" xmlns="" id="{2FAC7C43-3F3F-4682-BCA1-920A01A7051E}"/>
+                <a16:creationId xmlns="" xmlns:a16="http://schemas.microsoft.com/office/drawing/2014/main" id="{2FAC7C43-3F3F-4682-BCA1-920A01A7051E}"/>
               </a:ext>
             </a:extLst>
           </p:cNvPr>
@@ -5027,7 +5023,7 @@
           <p:cNvPr id="9" name="Picture 8">
             <a:extLst>
               <a:ext uri="{FF2B5EF4-FFF2-40B4-BE49-F238E27FC236}">
-                <a16:creationId xmlns:a16="http://schemas.microsoft.com/office/drawing/2014/main" xmlns="" id="{A58CEA5D-C842-4693-B0A9-A8BB8F90A402}"/>
+                <a16:creationId xmlns="" xmlns:a16="http://schemas.microsoft.com/office/drawing/2014/main" id="{A58CEA5D-C842-4693-B0A9-A8BB8F90A402}"/>
               </a:ext>
             </a:extLst>
           </p:cNvPr>
@@ -5087,7 +5083,7 @@
           <p:cNvPr id="2" name="Title 1">
             <a:extLst>
               <a:ext uri="{FF2B5EF4-FFF2-40B4-BE49-F238E27FC236}">
-                <a16:creationId xmlns:a16="http://schemas.microsoft.com/office/drawing/2014/main" xmlns="" id="{01A0DD28-5148-414A-9056-8738F944E497}"/>
+                <a16:creationId xmlns="" xmlns:a16="http://schemas.microsoft.com/office/drawing/2014/main" id="{01A0DD28-5148-414A-9056-8738F944E497}"/>
               </a:ext>
             </a:extLst>
           </p:cNvPr>
@@ -5115,7 +5111,7 @@
           <p:cNvPr id="3" name="Content Placeholder 2">
             <a:extLst>
               <a:ext uri="{FF2B5EF4-FFF2-40B4-BE49-F238E27FC236}">
-                <a16:creationId xmlns:a16="http://schemas.microsoft.com/office/drawing/2014/main" xmlns="" id="{76DCCC5B-C058-4FE5-8A04-71761AF559FA}"/>
+                <a16:creationId xmlns="" xmlns:a16="http://schemas.microsoft.com/office/drawing/2014/main" id="{76DCCC5B-C058-4FE5-8A04-71761AF559FA}"/>
               </a:ext>
             </a:extLst>
           </p:cNvPr>
@@ -5216,7 +5212,7 @@
           <p:cNvPr id="4" name="Footer Placeholder 3">
             <a:extLst>
               <a:ext uri="{FF2B5EF4-FFF2-40B4-BE49-F238E27FC236}">
-                <a16:creationId xmlns:a16="http://schemas.microsoft.com/office/drawing/2014/main" xmlns="" id="{B3AB935C-693A-4BE4-93FC-C400F802D784}"/>
+                <a16:creationId xmlns="" xmlns:a16="http://schemas.microsoft.com/office/drawing/2014/main" id="{B3AB935C-693A-4BE4-93FC-C400F802D784}"/>
               </a:ext>
             </a:extLst>
           </p:cNvPr>
@@ -5234,7 +5230,7 @@
           <a:p>
             <a:r>
               <a:rPr lang="en-US" smtClean="0"/>
-              <a:t>Copyright 2017, EV3Lessons.com (Last Edit 8/24/2017)</a:t>
+              <a:t>Copyright 2017, EV3Lessons.com (Last Edit 8/26/2017)</a:t>
             </a:r>
             <a:endParaRPr lang="en-US" dirty="0"/>
           </a:p>
@@ -5245,7 +5241,7 @@
           <p:cNvPr id="5" name="Slide Number Placeholder 4">
             <a:extLst>
               <a:ext uri="{FF2B5EF4-FFF2-40B4-BE49-F238E27FC236}">
-                <a16:creationId xmlns:a16="http://schemas.microsoft.com/office/drawing/2014/main" xmlns="" id="{D97B9E76-AACB-4EDF-ADF8-CC085E634338}"/>
+                <a16:creationId xmlns="" xmlns:a16="http://schemas.microsoft.com/office/drawing/2014/main" id="{D97B9E76-AACB-4EDF-ADF8-CC085E634338}"/>
               </a:ext>
             </a:extLst>
           </p:cNvPr>
@@ -5578,7 +5574,7 @@
           <p:cNvPr id="2" name="Title 1">
             <a:extLst>
               <a:ext uri="{FF2B5EF4-FFF2-40B4-BE49-F238E27FC236}">
-                <a16:creationId xmlns:a16="http://schemas.microsoft.com/office/drawing/2014/main" xmlns="" id="{A451199F-7E3E-440D-83F9-4A1B6C62992F}"/>
+                <a16:creationId xmlns="" xmlns:a16="http://schemas.microsoft.com/office/drawing/2014/main" id="{A451199F-7E3E-440D-83F9-4A1B6C62992F}"/>
               </a:ext>
             </a:extLst>
           </p:cNvPr>
@@ -5607,7 +5603,7 @@
           <p:cNvPr id="3" name="Content Placeholder 2">
             <a:extLst>
               <a:ext uri="{FF2B5EF4-FFF2-40B4-BE49-F238E27FC236}">
-                <a16:creationId xmlns:a16="http://schemas.microsoft.com/office/drawing/2014/main" xmlns="" id="{C129EE7C-955F-4973-844C-88E89273074A}"/>
+                <a16:creationId xmlns="" xmlns:a16="http://schemas.microsoft.com/office/drawing/2014/main" id="{C129EE7C-955F-4973-844C-88E89273074A}"/>
               </a:ext>
             </a:extLst>
           </p:cNvPr>
@@ -5663,11 +5659,7 @@
             </a:pPr>
             <a:r>
               <a:rPr lang="en-US" dirty="0"/>
-              <a:t>The team will need to create a </a:t>
-            </a:r>
-            <a:r>
-              <a:rPr lang="en-US" dirty="0"/>
-              <a:t>5</a:t>
+              <a:t>The team will need to create a 5</a:t>
             </a:r>
             <a:r>
               <a:rPr lang="en-US" dirty="0" smtClean="0"/>
@@ -5679,11 +5671,7 @@
             </a:r>
             <a:r>
               <a:rPr lang="en-US" dirty="0" smtClean="0"/>
-              <a:t>for</a:t>
-            </a:r>
-            <a:r>
-              <a:rPr lang="en-US" dirty="0" smtClean="0"/>
-              <a:t> </a:t>
+              <a:t>for </a:t>
             </a:r>
             <a:r>
               <a:rPr lang="en-US" dirty="0"/>
@@ -5719,15 +5707,7 @@
             </a:pPr>
             <a:r>
               <a:rPr lang="en-US" dirty="0" smtClean="0"/>
-              <a:t>You </a:t>
-            </a:r>
-            <a:r>
-              <a:rPr lang="en-US" dirty="0" smtClean="0"/>
-              <a:t>also have </a:t>
-            </a:r>
-            <a:r>
-              <a:rPr lang="en-US" dirty="0" smtClean="0"/>
-              <a:t>to fill </a:t>
+              <a:t>You also have to fill </a:t>
             </a:r>
             <a:r>
               <a:rPr lang="en-US" dirty="0"/>
@@ -5746,7 +5726,7 @@
           <p:cNvPr id="4" name="Footer Placeholder 3">
             <a:extLst>
               <a:ext uri="{FF2B5EF4-FFF2-40B4-BE49-F238E27FC236}">
-                <a16:creationId xmlns:a16="http://schemas.microsoft.com/office/drawing/2014/main" xmlns="" id="{73815A05-5A37-4260-B08C-6055DBF25CE6}"/>
+                <a16:creationId xmlns="" xmlns:a16="http://schemas.microsoft.com/office/drawing/2014/main" id="{73815A05-5A37-4260-B08C-6055DBF25CE6}"/>
               </a:ext>
             </a:extLst>
           </p:cNvPr>
@@ -5764,7 +5744,7 @@
           <a:p>
             <a:r>
               <a:rPr lang="en-US" smtClean="0"/>
-              <a:t>Copyright 2017, EV3Lessons.com (Last Edit 8/24/2017)</a:t>
+              <a:t>Copyright 2017, EV3Lessons.com (Last Edit 8/26/2017)</a:t>
             </a:r>
             <a:endParaRPr lang="en-US" dirty="0"/>
           </a:p>
@@ -5775,7 +5755,7 @@
           <p:cNvPr id="5" name="Slide Number Placeholder 4">
             <a:extLst>
               <a:ext uri="{FF2B5EF4-FFF2-40B4-BE49-F238E27FC236}">
-                <a16:creationId xmlns:a16="http://schemas.microsoft.com/office/drawing/2014/main" xmlns="" id="{877EDF2C-353B-499D-831F-222DC2C020EC}"/>
+                <a16:creationId xmlns="" xmlns:a16="http://schemas.microsoft.com/office/drawing/2014/main" id="{877EDF2C-353B-499D-831F-222DC2C020EC}"/>
               </a:ext>
             </a:extLst>
           </p:cNvPr>
@@ -5804,7 +5784,7 @@
           <p:cNvPr id="6" name="Picture 5">
             <a:extLst>
               <a:ext uri="{FF2B5EF4-FFF2-40B4-BE49-F238E27FC236}">
-                <a16:creationId xmlns:a16="http://schemas.microsoft.com/office/drawing/2014/main" xmlns="" id="{B606DEEE-C348-4CD4-9430-269D868710D7}"/>
+                <a16:creationId xmlns="" xmlns:a16="http://schemas.microsoft.com/office/drawing/2014/main" id="{B606DEEE-C348-4CD4-9430-269D868710D7}"/>
               </a:ext>
             </a:extLst>
           </p:cNvPr>
@@ -5898,7 +5878,7 @@
           <p:cNvPr id="2" name="Title 1">
             <a:extLst>
               <a:ext uri="{FF2B5EF4-FFF2-40B4-BE49-F238E27FC236}">
-                <a16:creationId xmlns:a16="http://schemas.microsoft.com/office/drawing/2014/main" xmlns="" id="{FC5FCDBA-CEC9-47A6-94D9-FD81EB5BDB97}"/>
+                <a16:creationId xmlns="" xmlns:a16="http://schemas.microsoft.com/office/drawing/2014/main" id="{FC5FCDBA-CEC9-47A6-94D9-FD81EB5BDB97}"/>
               </a:ext>
             </a:extLst>
           </p:cNvPr>
@@ -5927,7 +5907,7 @@
           <p:cNvPr id="3" name="Content Placeholder 2">
             <a:extLst>
               <a:ext uri="{FF2B5EF4-FFF2-40B4-BE49-F238E27FC236}">
-                <a16:creationId xmlns:a16="http://schemas.microsoft.com/office/drawing/2014/main" xmlns="" id="{C5853E52-4524-44F2-B5F4-FDE45926613C}"/>
+                <a16:creationId xmlns="" xmlns:a16="http://schemas.microsoft.com/office/drawing/2014/main" id="{C5853E52-4524-44F2-B5F4-FDE45926613C}"/>
               </a:ext>
             </a:extLst>
           </p:cNvPr>
@@ -5971,27 +5951,7 @@
             </a:pPr>
             <a:r>
               <a:rPr lang="en-US" sz="1600" dirty="0" smtClean="0"/>
-              <a:t>W</a:t>
-            </a:r>
-            <a:r>
-              <a:rPr lang="en-US" sz="1600" dirty="0" smtClean="0"/>
-              <a:t>e </a:t>
-            </a:r>
-            <a:r>
-              <a:rPr lang="en-US" sz="1600" dirty="0" smtClean="0"/>
-              <a:t>recommend </a:t>
-            </a:r>
-            <a:r>
-              <a:rPr lang="en-US" sz="1600" dirty="0" smtClean="0"/>
-              <a:t>writing </a:t>
-            </a:r>
-            <a:r>
-              <a:rPr lang="en-US" sz="1600" dirty="0" smtClean="0"/>
-              <a:t>a </a:t>
-            </a:r>
-            <a:r>
-              <a:rPr lang="en-US" sz="1600" dirty="0" smtClean="0"/>
-              <a:t>script based on the GIA </a:t>
+              <a:t>We recommend writing a script based on the GIA </a:t>
             </a:r>
             <a:r>
               <a:rPr lang="en-US" sz="1600" dirty="0"/>
@@ -6009,7 +5969,6 @@
               <a:rPr lang="en-US" sz="1600" dirty="0" smtClean="0"/>
               <a:t>.</a:t>
             </a:r>
-            <a:endParaRPr lang="en-US" sz="1600" dirty="0" smtClean="0"/>
           </a:p>
           <a:p>
             <a:pPr marL="0" indent="0">
@@ -6048,11 +6007,7 @@
             </a:pPr>
             <a:r>
               <a:rPr lang="en-US" sz="1600" dirty="0" smtClean="0"/>
-              <a:t>If you are a semi-finalist, FIRST</a:t>
-            </a:r>
-            <a:r>
-              <a:rPr lang="en-US" sz="1600" dirty="0" smtClean="0"/>
-              <a:t> also suggests </a:t>
+              <a:t>If you are a semi-finalist, FIRST also suggests </a:t>
             </a:r>
             <a:r>
               <a:rPr lang="en-US" sz="1600" dirty="0"/>
@@ -6075,7 +6030,7 @@
           <p:cNvPr id="4" name="Footer Placeholder 3">
             <a:extLst>
               <a:ext uri="{FF2B5EF4-FFF2-40B4-BE49-F238E27FC236}">
-                <a16:creationId xmlns:a16="http://schemas.microsoft.com/office/drawing/2014/main" xmlns="" id="{9BAC6EEA-A67C-456D-992E-46B6403B8587}"/>
+                <a16:creationId xmlns="" xmlns:a16="http://schemas.microsoft.com/office/drawing/2014/main" id="{9BAC6EEA-A67C-456D-992E-46B6403B8587}"/>
               </a:ext>
             </a:extLst>
           </p:cNvPr>
@@ -6093,7 +6048,7 @@
           <a:p>
             <a:r>
               <a:rPr lang="en-US" smtClean="0"/>
-              <a:t>Copyright 2017, EV3Lessons.com (Last Edit 8/24/2017)</a:t>
+              <a:t>Copyright 2017, EV3Lessons.com (Last Edit 8/26/2017)</a:t>
             </a:r>
             <a:endParaRPr lang="en-US" dirty="0"/>
           </a:p>
@@ -6104,7 +6059,7 @@
           <p:cNvPr id="5" name="Slide Number Placeholder 4">
             <a:extLst>
               <a:ext uri="{FF2B5EF4-FFF2-40B4-BE49-F238E27FC236}">
-                <a16:creationId xmlns:a16="http://schemas.microsoft.com/office/drawing/2014/main" xmlns="" id="{1D439343-C553-465A-B248-F2AFB13960B1}"/>
+                <a16:creationId xmlns="" xmlns:a16="http://schemas.microsoft.com/office/drawing/2014/main" id="{1D439343-C553-465A-B248-F2AFB13960B1}"/>
               </a:ext>
             </a:extLst>
           </p:cNvPr>
@@ -6230,7 +6185,7 @@
           <p:cNvPr id="9" name="Picture 8">
             <a:extLst>
               <a:ext uri="{FF2B5EF4-FFF2-40B4-BE49-F238E27FC236}">
-                <a16:creationId xmlns:a16="http://schemas.microsoft.com/office/drawing/2014/main" xmlns="" id="{4B309160-7AC5-4EE3-9136-5498D5C61B09}"/>
+                <a16:creationId xmlns="" xmlns:a16="http://schemas.microsoft.com/office/drawing/2014/main" id="{4B309160-7AC5-4EE3-9136-5498D5C61B09}"/>
               </a:ext>
             </a:extLst>
           </p:cNvPr>
@@ -6289,7 +6244,7 @@
           <p:cNvPr id="2" name="Title 1">
             <a:extLst>
               <a:ext uri="{FF2B5EF4-FFF2-40B4-BE49-F238E27FC236}">
-                <a16:creationId xmlns:a16="http://schemas.microsoft.com/office/drawing/2014/main" xmlns="" id="{8F25AB16-A7C3-45CD-A246-2A2F8AF8C811}"/>
+                <a16:creationId xmlns="" xmlns:a16="http://schemas.microsoft.com/office/drawing/2014/main" id="{8F25AB16-A7C3-45CD-A246-2A2F8AF8C811}"/>
               </a:ext>
             </a:extLst>
           </p:cNvPr>
@@ -6318,7 +6273,7 @@
           <p:cNvPr id="3" name="Content Placeholder 2">
             <a:extLst>
               <a:ext uri="{FF2B5EF4-FFF2-40B4-BE49-F238E27FC236}">
-                <a16:creationId xmlns:a16="http://schemas.microsoft.com/office/drawing/2014/main" xmlns="" id="{F1620C52-D741-4DD5-9DEE-30613DB2AD4D}"/>
+                <a16:creationId xmlns="" xmlns:a16="http://schemas.microsoft.com/office/drawing/2014/main" id="{F1620C52-D741-4DD5-9DEE-30613DB2AD4D}"/>
               </a:ext>
             </a:extLst>
           </p:cNvPr>
@@ -6429,7 +6384,7 @@
           <p:cNvPr id="4" name="Footer Placeholder 3">
             <a:extLst>
               <a:ext uri="{FF2B5EF4-FFF2-40B4-BE49-F238E27FC236}">
-                <a16:creationId xmlns:a16="http://schemas.microsoft.com/office/drawing/2014/main" xmlns="" id="{67DDAE65-5F6A-4494-AEEF-BB0F45CC9C85}"/>
+                <a16:creationId xmlns="" xmlns:a16="http://schemas.microsoft.com/office/drawing/2014/main" id="{67DDAE65-5F6A-4494-AEEF-BB0F45CC9C85}"/>
               </a:ext>
             </a:extLst>
           </p:cNvPr>
@@ -6452,7 +6407,7 @@
           <a:p>
             <a:r>
               <a:rPr lang="en-US" smtClean="0"/>
-              <a:t>Copyright 2017, EV3Lessons.com (Last Edit 8/24/2017)</a:t>
+              <a:t>Copyright 2017, EV3Lessons.com (Last Edit 8/26/2017)</a:t>
             </a:r>
             <a:endParaRPr lang="en-US" dirty="0"/>
           </a:p>
@@ -6463,7 +6418,7 @@
           <p:cNvPr id="5" name="Slide Number Placeholder 4">
             <a:extLst>
               <a:ext uri="{FF2B5EF4-FFF2-40B4-BE49-F238E27FC236}">
-                <a16:creationId xmlns:a16="http://schemas.microsoft.com/office/drawing/2014/main" xmlns="" id="{3332E168-DCFA-48AB-91B9-1C620597F1F0}"/>
+                <a16:creationId xmlns="" xmlns:a16="http://schemas.microsoft.com/office/drawing/2014/main" id="{3332E168-DCFA-48AB-91B9-1C620597F1F0}"/>
               </a:ext>
             </a:extLst>
           </p:cNvPr>
@@ -6492,7 +6447,7 @@
           <p:cNvPr id="6" name="Picture 5">
             <a:extLst>
               <a:ext uri="{FF2B5EF4-FFF2-40B4-BE49-F238E27FC236}">
-                <a16:creationId xmlns:a16="http://schemas.microsoft.com/office/drawing/2014/main" xmlns="" id="{0A0075DD-D990-4146-8D76-B15BF292090F}"/>
+                <a16:creationId xmlns="" xmlns:a16="http://schemas.microsoft.com/office/drawing/2014/main" id="{0A0075DD-D990-4146-8D76-B15BF292090F}"/>
               </a:ext>
             </a:extLst>
           </p:cNvPr>
@@ -6551,7 +6506,7 @@
           <p:cNvPr id="2" name="Title 1">
             <a:extLst>
               <a:ext uri="{FF2B5EF4-FFF2-40B4-BE49-F238E27FC236}">
-                <a16:creationId xmlns:a16="http://schemas.microsoft.com/office/drawing/2014/main" xmlns="" id="{A7085442-4074-469F-8A4B-254E75D8BF61}"/>
+                <a16:creationId xmlns="" xmlns:a16="http://schemas.microsoft.com/office/drawing/2014/main" id="{A7085442-4074-469F-8A4B-254E75D8BF61}"/>
               </a:ext>
             </a:extLst>
           </p:cNvPr>
@@ -6580,7 +6535,7 @@
           <p:cNvPr id="3" name="Content Placeholder 2">
             <a:extLst>
               <a:ext uri="{FF2B5EF4-FFF2-40B4-BE49-F238E27FC236}">
-                <a16:creationId xmlns:a16="http://schemas.microsoft.com/office/drawing/2014/main" xmlns="" id="{4ABD0397-04FA-4D38-9BD8-CA889E5ED9CF}"/>
+                <a16:creationId xmlns="" xmlns:a16="http://schemas.microsoft.com/office/drawing/2014/main" id="{4ABD0397-04FA-4D38-9BD8-CA889E5ED9CF}"/>
               </a:ext>
             </a:extLst>
           </p:cNvPr>
@@ -6643,11 +6598,7 @@
             </a:r>
             <a:r>
               <a:rPr lang="en-US" sz="1600" dirty="0"/>
-              <a:t>from the team should be there during the pit area </a:t>
-            </a:r>
-            <a:r>
-              <a:rPr lang="en-US" sz="1600" dirty="0"/>
-              <a:t>judging and </a:t>
+              <a:t>from the team should be there during the pit area judging and </a:t>
             </a:r>
             <a:r>
               <a:rPr lang="en-US" sz="1600" dirty="0" smtClean="0"/>
@@ -6736,7 +6687,7 @@
           <p:cNvPr id="4" name="Footer Placeholder 3">
             <a:extLst>
               <a:ext uri="{FF2B5EF4-FFF2-40B4-BE49-F238E27FC236}">
-                <a16:creationId xmlns:a16="http://schemas.microsoft.com/office/drawing/2014/main" xmlns="" id="{EE0E3BBE-8724-4B72-B49C-EF68DAAA9D87}"/>
+                <a16:creationId xmlns="" xmlns:a16="http://schemas.microsoft.com/office/drawing/2014/main" id="{EE0E3BBE-8724-4B72-B49C-EF68DAAA9D87}"/>
               </a:ext>
             </a:extLst>
           </p:cNvPr>
@@ -6754,7 +6705,7 @@
           <a:p>
             <a:r>
               <a:rPr lang="en-US" smtClean="0"/>
-              <a:t>Copyright 2017, EV3Lessons.com (Last Edit 8/24/2017)</a:t>
+              <a:t>Copyright 2017, EV3Lessons.com (Last Edit 8/26/2017)</a:t>
             </a:r>
             <a:endParaRPr lang="en-US" dirty="0"/>
           </a:p>
@@ -6765,7 +6716,7 @@
           <p:cNvPr id="5" name="Slide Number Placeholder 4">
             <a:extLst>
               <a:ext uri="{FF2B5EF4-FFF2-40B4-BE49-F238E27FC236}">
-                <a16:creationId xmlns:a16="http://schemas.microsoft.com/office/drawing/2014/main" xmlns="" id="{CE02049F-4202-4F20-ABF5-461FE33E916A}"/>
+                <a16:creationId xmlns="" xmlns:a16="http://schemas.microsoft.com/office/drawing/2014/main" id="{CE02049F-4202-4F20-ABF5-461FE33E916A}"/>
               </a:ext>
             </a:extLst>
           </p:cNvPr>
@@ -6794,7 +6745,7 @@
           <p:cNvPr id="7" name="Picture 6">
             <a:extLst>
               <a:ext uri="{FF2B5EF4-FFF2-40B4-BE49-F238E27FC236}">
-                <a16:creationId xmlns:a16="http://schemas.microsoft.com/office/drawing/2014/main" xmlns="" id="{4A09AF60-F954-4C66-BEF5-1A5438C463CF}"/>
+                <a16:creationId xmlns="" xmlns:a16="http://schemas.microsoft.com/office/drawing/2014/main" id="{4A09AF60-F954-4C66-BEF5-1A5438C463CF}"/>
               </a:ext>
             </a:extLst>
           </p:cNvPr>
@@ -6853,7 +6804,7 @@
           <p:cNvPr id="2" name="Title 1">
             <a:extLst>
               <a:ext uri="{FF2B5EF4-FFF2-40B4-BE49-F238E27FC236}">
-                <a16:creationId xmlns:a16="http://schemas.microsoft.com/office/drawing/2014/main" xmlns="" id="{F71DB9B5-7884-4286-BB9B-887C55215A3D}"/>
+                <a16:creationId xmlns="" xmlns:a16="http://schemas.microsoft.com/office/drawing/2014/main" id="{F71DB9B5-7884-4286-BB9B-887C55215A3D}"/>
               </a:ext>
             </a:extLst>
           </p:cNvPr>
@@ -6886,7 +6837,7 @@
           <p:cNvPr id="3" name="Content Placeholder 2">
             <a:extLst>
               <a:ext uri="{FF2B5EF4-FFF2-40B4-BE49-F238E27FC236}">
-                <a16:creationId xmlns:a16="http://schemas.microsoft.com/office/drawing/2014/main" xmlns="" id="{9AC6FC5A-CCD8-41C0-9BF4-3F1E635D528D}"/>
+                <a16:creationId xmlns="" xmlns:a16="http://schemas.microsoft.com/office/drawing/2014/main" id="{9AC6FC5A-CCD8-41C0-9BF4-3F1E635D528D}"/>
               </a:ext>
             </a:extLst>
           </p:cNvPr>
@@ -6922,11 +6873,7 @@
             </a:r>
             <a:r>
               <a:rPr lang="en-US" sz="1600" dirty="0" smtClean="0"/>
-              <a:t>The team </a:t>
-            </a:r>
-            <a:r>
-              <a:rPr lang="en-US" sz="1600" dirty="0" smtClean="0"/>
-              <a:t>lists </a:t>
+              <a:t>The team lists </a:t>
             </a:r>
             <a:r>
               <a:rPr lang="en-US" sz="1600" dirty="0"/>
@@ -6990,7 +6937,7 @@
           <p:cNvPr id="4" name="Footer Placeholder 3">
             <a:extLst>
               <a:ext uri="{FF2B5EF4-FFF2-40B4-BE49-F238E27FC236}">
-                <a16:creationId xmlns:a16="http://schemas.microsoft.com/office/drawing/2014/main" xmlns="" id="{C63ACA71-1C8B-4831-8620-87E3594E60B7}"/>
+                <a16:creationId xmlns="" xmlns:a16="http://schemas.microsoft.com/office/drawing/2014/main" id="{C63ACA71-1C8B-4831-8620-87E3594E60B7}"/>
               </a:ext>
             </a:extLst>
           </p:cNvPr>
@@ -7008,7 +6955,7 @@
           <a:p>
             <a:r>
               <a:rPr lang="en-US" smtClean="0"/>
-              <a:t>Copyright 2017, EV3Lessons.com (Last Edit 8/24/2017)</a:t>
+              <a:t>Copyright 2017, EV3Lessons.com (Last Edit 8/26/2017)</a:t>
             </a:r>
             <a:endParaRPr lang="en-US" dirty="0"/>
           </a:p>
@@ -7019,7 +6966,7 @@
           <p:cNvPr id="5" name="Slide Number Placeholder 4">
             <a:extLst>
               <a:ext uri="{FF2B5EF4-FFF2-40B4-BE49-F238E27FC236}">
-                <a16:creationId xmlns:a16="http://schemas.microsoft.com/office/drawing/2014/main" xmlns="" id="{FCD0AB10-E908-4736-9959-DBBE305DCF97}"/>
+                <a16:creationId xmlns="" xmlns:a16="http://schemas.microsoft.com/office/drawing/2014/main" id="{FCD0AB10-E908-4736-9959-DBBE305DCF97}"/>
               </a:ext>
             </a:extLst>
           </p:cNvPr>
@@ -7048,7 +6995,7 @@
           <p:cNvPr id="6" name="Picture 5">
             <a:extLst>
               <a:ext uri="{FF2B5EF4-FFF2-40B4-BE49-F238E27FC236}">
-                <a16:creationId xmlns:a16="http://schemas.microsoft.com/office/drawing/2014/main" xmlns="" id="{8387993A-6B95-4405-B8CA-D57043107E9C}"/>
+                <a16:creationId xmlns="" xmlns:a16="http://schemas.microsoft.com/office/drawing/2014/main" id="{8387993A-6B95-4405-B8CA-D57043107E9C}"/>
               </a:ext>
             </a:extLst>
           </p:cNvPr>
@@ -7152,33 +7099,17 @@
             </a:r>
             <a:r>
               <a:rPr lang="en-US" dirty="0" smtClean="0"/>
-              <a:t>GEN, with some edits by </a:t>
-            </a:r>
+              <a:t>GEN, with some edits by EV3Lessons</a:t>
+            </a:r>
+          </a:p>
+          <a:p>
             <a:r>
               <a:rPr lang="en-US" dirty="0" smtClean="0"/>
-              <a:t>EV3Lessons</a:t>
-            </a:r>
-          </a:p>
-          <a:p>
-            <a:r>
-              <a:rPr lang="en-US" dirty="0" smtClean="0"/>
-              <a:t>You </a:t>
-            </a:r>
-            <a:r>
-              <a:rPr lang="en-US" dirty="0" smtClean="0"/>
-              <a:t>can </a:t>
+              <a:t>You can </a:t>
             </a:r>
             <a:r>
               <a:rPr lang="en-US" dirty="0"/>
-              <a:t>contact </a:t>
-            </a:r>
-            <a:r>
-              <a:rPr lang="en-US" dirty="0"/>
-              <a:t>Team 3659 NeXT GEN </a:t>
-            </a:r>
-            <a:r>
-              <a:rPr lang="en-US" dirty="0"/>
-              <a:t>through </a:t>
+              <a:t>contact Team 3659 NeXT GEN through </a:t>
             </a:r>
             <a:r>
               <a:rPr lang="en-US" dirty="0" smtClean="0"/>
@@ -7236,7 +7167,7 @@
           <a:p>
             <a:r>
               <a:rPr lang="en-US" smtClean="0"/>
-              <a:t>Copyright 2017, EV3Lessons.com (Last Edit 8/24/2017)</a:t>
+              <a:t>Copyright 2017, EV3Lessons.com (Last Edit 8/26/2017)</a:t>
             </a:r>
             <a:endParaRPr lang="en-US" dirty="0"/>
           </a:p>
@@ -7481,7 +7412,7 @@
           <a:p>
             <a:r>
               <a:rPr lang="en-US" smtClean="0"/>
-              <a:t>Copyright 2017, EV3Lessons.com (Last Edit 8/24/2017)</a:t>
+              <a:t>Copyright 2017, EV3Lessons.com (Last Edit 8/26/2017)</a:t>
             </a:r>
             <a:endParaRPr lang="en-US" dirty="0"/>
           </a:p>
@@ -7515,7 +7446,7 @@
           <p:cNvPr id="10" name="Picture 9">
             <a:extLst>
               <a:ext uri="{FF2B5EF4-FFF2-40B4-BE49-F238E27FC236}">
-                <a16:creationId xmlns:a16="http://schemas.microsoft.com/office/drawing/2014/main" xmlns="" id="{ACD91645-228F-4215-BAD4-320E2B349257}"/>
+                <a16:creationId xmlns="" xmlns:a16="http://schemas.microsoft.com/office/drawing/2014/main" id="{ACD91645-228F-4215-BAD4-320E2B349257}"/>
               </a:ext>
             </a:extLst>
           </p:cNvPr>
@@ -7638,7 +7569,7 @@
           <p:cNvPr id="2" name="Title 1">
             <a:extLst>
               <a:ext uri="{FF2B5EF4-FFF2-40B4-BE49-F238E27FC236}">
-                <a16:creationId xmlns:a16="http://schemas.microsoft.com/office/drawing/2014/main" xmlns="" id="{9F420A84-70CA-4260-B3F9-B1E534867174}"/>
+                <a16:creationId xmlns="" xmlns:a16="http://schemas.microsoft.com/office/drawing/2014/main" id="{9F420A84-70CA-4260-B3F9-B1E534867174}"/>
               </a:ext>
             </a:extLst>
           </p:cNvPr>
@@ -7656,15 +7587,7 @@
           <a:p>
             <a:r>
               <a:rPr lang="en-US" dirty="0" smtClean="0"/>
-              <a:t>Nomination </a:t>
-            </a:r>
-            <a:r>
-              <a:rPr lang="en-US" dirty="0" smtClean="0"/>
-              <a:t>&amp; </a:t>
-            </a:r>
-            <a:r>
-              <a:rPr lang="en-US" dirty="0" smtClean="0"/>
-              <a:t>Application Process</a:t>
+              <a:t>Nomination &amp; Application Process</a:t>
             </a:r>
             <a:endParaRPr lang="en-US" dirty="0"/>
           </a:p>
@@ -7675,7 +7598,7 @@
           <p:cNvPr id="3" name="Content Placeholder 2">
             <a:extLst>
               <a:ext uri="{FF2B5EF4-FFF2-40B4-BE49-F238E27FC236}">
-                <a16:creationId xmlns:a16="http://schemas.microsoft.com/office/drawing/2014/main" xmlns="" id="{B377B29E-98B4-4DAD-839C-1184232EA84F}"/>
+                <a16:creationId xmlns="" xmlns:a16="http://schemas.microsoft.com/office/drawing/2014/main" id="{B377B29E-98B4-4DAD-839C-1184232EA84F}"/>
               </a:ext>
             </a:extLst>
           </p:cNvPr>
@@ -7812,7 +7735,7 @@
           <p:cNvPr id="4" name="Footer Placeholder 3">
             <a:extLst>
               <a:ext uri="{FF2B5EF4-FFF2-40B4-BE49-F238E27FC236}">
-                <a16:creationId xmlns:a16="http://schemas.microsoft.com/office/drawing/2014/main" xmlns="" id="{0740746C-5A6A-47D2-B694-C69CA684AFC0}"/>
+                <a16:creationId xmlns="" xmlns:a16="http://schemas.microsoft.com/office/drawing/2014/main" id="{0740746C-5A6A-47D2-B694-C69CA684AFC0}"/>
               </a:ext>
             </a:extLst>
           </p:cNvPr>
@@ -7830,7 +7753,7 @@
           <a:p>
             <a:r>
               <a:rPr lang="en-US" smtClean="0"/>
-              <a:t>Copyright 2017, EV3Lessons.com (Last Edit 8/24/2017)</a:t>
+              <a:t>Copyright 2017, EV3Lessons.com (Last Edit 8/26/2017)</a:t>
             </a:r>
             <a:endParaRPr lang="en-US" dirty="0"/>
           </a:p>
@@ -7841,7 +7764,7 @@
           <p:cNvPr id="5" name="Slide Number Placeholder 4">
             <a:extLst>
               <a:ext uri="{FF2B5EF4-FFF2-40B4-BE49-F238E27FC236}">
-                <a16:creationId xmlns:a16="http://schemas.microsoft.com/office/drawing/2014/main" xmlns="" id="{AFB2F7EB-75AE-4B1F-9CB7-980A8F0971CA}"/>
+                <a16:creationId xmlns="" xmlns:a16="http://schemas.microsoft.com/office/drawing/2014/main" id="{AFB2F7EB-75AE-4B1F-9CB7-980A8F0971CA}"/>
               </a:ext>
             </a:extLst>
           </p:cNvPr>
@@ -8070,7 +7993,7 @@
           <p:cNvPr id="12" name="Content Placeholder 2">
             <a:extLst>
               <a:ext uri="{FF2B5EF4-FFF2-40B4-BE49-F238E27FC236}">
-                <a16:creationId xmlns:a16="http://schemas.microsoft.com/office/drawing/2014/main" xmlns="" id="{13B020DC-457A-4256-91D1-97F56FF5FA3E}"/>
+                <a16:creationId xmlns="" xmlns:a16="http://schemas.microsoft.com/office/drawing/2014/main" id="{13B020DC-457A-4256-91D1-97F56FF5FA3E}"/>
               </a:ext>
             </a:extLst>
           </p:cNvPr>
@@ -8348,11 +8271,7 @@
             </a:pPr>
             <a:r>
               <a:rPr lang="en-US" sz="1800" b="1" u="sng" dirty="0" smtClean="0"/>
-              <a:t> </a:t>
-            </a:r>
-            <a:r>
-              <a:rPr lang="en-US" sz="1800" b="1" u="sng" dirty="0" smtClean="0"/>
-              <a:t>Application Requirements</a:t>
+              <a:t> Application Requirements</a:t>
             </a:r>
             <a:endParaRPr lang="en-US" sz="1800" b="1" u="sng" dirty="0"/>
           </a:p>
@@ -8363,7 +8282,7 @@
           <p:cNvPr id="13" name="Content Placeholder 2">
             <a:extLst>
               <a:ext uri="{FF2B5EF4-FFF2-40B4-BE49-F238E27FC236}">
-                <a16:creationId xmlns:a16="http://schemas.microsoft.com/office/drawing/2014/main" xmlns="" id="{13B020DC-457A-4256-91D1-97F56FF5FA3E}"/>
+                <a16:creationId xmlns="" xmlns:a16="http://schemas.microsoft.com/office/drawing/2014/main" id="{13B020DC-457A-4256-91D1-97F56FF5FA3E}"/>
               </a:ext>
             </a:extLst>
           </p:cNvPr>
@@ -8741,11 +8660,7 @@
             <a:pPr algn="ctr"/>
             <a:r>
               <a:rPr lang="en-US" dirty="0" smtClean="0"/>
-              <a:t>Innovative </a:t>
-            </a:r>
-            <a:r>
-              <a:rPr lang="en-US" dirty="0" smtClean="0"/>
-              <a:t>Solution</a:t>
+              <a:t>Innovative Solution</a:t>
             </a:r>
             <a:endParaRPr lang="en-US" dirty="0"/>
           </a:p>
@@ -8786,7 +8701,7 @@
           <p:cNvPr id="2" name="Title 1">
             <a:extLst>
               <a:ext uri="{FF2B5EF4-FFF2-40B4-BE49-F238E27FC236}">
-                <a16:creationId xmlns:a16="http://schemas.microsoft.com/office/drawing/2014/main" xmlns="" id="{A5281FB8-CDB2-48B0-BFBE-2725AFD26493}"/>
+                <a16:creationId xmlns="" xmlns:a16="http://schemas.microsoft.com/office/drawing/2014/main" id="{A5281FB8-CDB2-48B0-BFBE-2725AFD26493}"/>
               </a:ext>
             </a:extLst>
           </p:cNvPr>
@@ -8824,7 +8739,7 @@
           <p:cNvPr id="3" name="Content Placeholder 2">
             <a:extLst>
               <a:ext uri="{FF2B5EF4-FFF2-40B4-BE49-F238E27FC236}">
-                <a16:creationId xmlns:a16="http://schemas.microsoft.com/office/drawing/2014/main" xmlns="" id="{83140F35-D52F-4C36-9E4C-411B8B1E6135}"/>
+                <a16:creationId xmlns="" xmlns:a16="http://schemas.microsoft.com/office/drawing/2014/main" id="{83140F35-D52F-4C36-9E4C-411B8B1E6135}"/>
               </a:ext>
             </a:extLst>
           </p:cNvPr>
@@ -8923,7 +8838,7 @@
           <p:cNvPr id="4" name="Footer Placeholder 3">
             <a:extLst>
               <a:ext uri="{FF2B5EF4-FFF2-40B4-BE49-F238E27FC236}">
-                <a16:creationId xmlns:a16="http://schemas.microsoft.com/office/drawing/2014/main" xmlns="" id="{307A8311-E126-44A8-AC72-C2CE1B82D718}"/>
+                <a16:creationId xmlns="" xmlns:a16="http://schemas.microsoft.com/office/drawing/2014/main" id="{307A8311-E126-44A8-AC72-C2CE1B82D718}"/>
               </a:ext>
             </a:extLst>
           </p:cNvPr>
@@ -8941,7 +8856,7 @@
           <a:p>
             <a:r>
               <a:rPr lang="en-US" smtClean="0"/>
-              <a:t>Copyright 2017, EV3Lessons.com (Last Edit 8/24/2017)</a:t>
+              <a:t>Copyright 2017, EV3Lessons.com (Last Edit 8/26/2017)</a:t>
             </a:r>
             <a:endParaRPr lang="en-US" dirty="0"/>
           </a:p>
@@ -8952,7 +8867,7 @@
           <p:cNvPr id="5" name="Slide Number Placeholder 4">
             <a:extLst>
               <a:ext uri="{FF2B5EF4-FFF2-40B4-BE49-F238E27FC236}">
-                <a16:creationId xmlns:a16="http://schemas.microsoft.com/office/drawing/2014/main" xmlns="" id="{2B7FC38A-43E2-4733-89C5-EE1582CEC9A8}"/>
+                <a16:creationId xmlns="" xmlns:a16="http://schemas.microsoft.com/office/drawing/2014/main" id="{2B7FC38A-43E2-4733-89C5-EE1582CEC9A8}"/>
               </a:ext>
             </a:extLst>
           </p:cNvPr>
@@ -9031,7 +8946,7 @@
           <p:cNvPr id="7" name="Picture 6">
             <a:extLst>
               <a:ext uri="{FF2B5EF4-FFF2-40B4-BE49-F238E27FC236}">
-                <a16:creationId xmlns:a16="http://schemas.microsoft.com/office/drawing/2014/main" xmlns="" id="{6C910D48-0D58-4F0B-A197-B211B41F87F8}"/>
+                <a16:creationId xmlns="" xmlns:a16="http://schemas.microsoft.com/office/drawing/2014/main" id="{6C910D48-0D58-4F0B-A197-B211B41F87F8}"/>
               </a:ext>
             </a:extLst>
           </p:cNvPr>
@@ -9090,7 +9005,7 @@
           <p:cNvPr id="2" name="Title 1">
             <a:extLst>
               <a:ext uri="{FF2B5EF4-FFF2-40B4-BE49-F238E27FC236}">
-                <a16:creationId xmlns:a16="http://schemas.microsoft.com/office/drawing/2014/main" xmlns="" id="{3C181E88-7B23-4FC8-A7B0-3CAD3162D50E}"/>
+                <a16:creationId xmlns="" xmlns:a16="http://schemas.microsoft.com/office/drawing/2014/main" id="{3C181E88-7B23-4FC8-A7B0-3CAD3162D50E}"/>
               </a:ext>
             </a:extLst>
           </p:cNvPr>
@@ -9119,7 +9034,7 @@
           <p:cNvPr id="3" name="Content Placeholder 2">
             <a:extLst>
               <a:ext uri="{FF2B5EF4-FFF2-40B4-BE49-F238E27FC236}">
-                <a16:creationId xmlns:a16="http://schemas.microsoft.com/office/drawing/2014/main" xmlns="" id="{EBB15F7E-092D-492D-B2D1-A9EB142B070E}"/>
+                <a16:creationId xmlns="" xmlns:a16="http://schemas.microsoft.com/office/drawing/2014/main" id="{EBB15F7E-092D-492D-B2D1-A9EB142B070E}"/>
               </a:ext>
             </a:extLst>
           </p:cNvPr>
@@ -9219,7 +9134,7 @@
           <p:cNvPr id="4" name="Footer Placeholder 3">
             <a:extLst>
               <a:ext uri="{FF2B5EF4-FFF2-40B4-BE49-F238E27FC236}">
-                <a16:creationId xmlns:a16="http://schemas.microsoft.com/office/drawing/2014/main" xmlns="" id="{BE77AF2C-2719-4731-9A72-21CD87F1DDDD}"/>
+                <a16:creationId xmlns="" xmlns:a16="http://schemas.microsoft.com/office/drawing/2014/main" id="{BE77AF2C-2719-4731-9A72-21CD87F1DDDD}"/>
               </a:ext>
             </a:extLst>
           </p:cNvPr>
@@ -9237,7 +9152,7 @@
           <a:p>
             <a:r>
               <a:rPr lang="en-US" smtClean="0"/>
-              <a:t>Copyright 2017, EV3Lessons.com (Last Edit 8/24/2017)</a:t>
+              <a:t>Copyright 2017, EV3Lessons.com (Last Edit 8/26/2017)</a:t>
             </a:r>
             <a:endParaRPr lang="en-US" dirty="0"/>
           </a:p>
@@ -9248,7 +9163,7 @@
           <p:cNvPr id="5" name="Slide Number Placeholder 4">
             <a:extLst>
               <a:ext uri="{FF2B5EF4-FFF2-40B4-BE49-F238E27FC236}">
-                <a16:creationId xmlns:a16="http://schemas.microsoft.com/office/drawing/2014/main" xmlns="" id="{24402251-AD9B-4990-87EF-B9E54D6FA28C}"/>
+                <a16:creationId xmlns="" xmlns:a16="http://schemas.microsoft.com/office/drawing/2014/main" id="{24402251-AD9B-4990-87EF-B9E54D6FA28C}"/>
               </a:ext>
             </a:extLst>
           </p:cNvPr>
@@ -9327,7 +9242,7 @@
           <p:cNvPr id="7" name="Picture 6" descr="A group of people around each other&#10;&#10;Description generated with very high confidence">
             <a:extLst>
               <a:ext uri="{FF2B5EF4-FFF2-40B4-BE49-F238E27FC236}">
-                <a16:creationId xmlns:a16="http://schemas.microsoft.com/office/drawing/2014/main" xmlns="" id="{078E0B64-EF0B-4C54-AA58-EEB224951F21}"/>
+                <a16:creationId xmlns="" xmlns:a16="http://schemas.microsoft.com/office/drawing/2014/main" id="{078E0B64-EF0B-4C54-AA58-EEB224951F21}"/>
               </a:ext>
             </a:extLst>
           </p:cNvPr>
@@ -9387,7 +9302,7 @@
           <p:cNvPr id="2" name="Title 1">
             <a:extLst>
               <a:ext uri="{FF2B5EF4-FFF2-40B4-BE49-F238E27FC236}">
-                <a16:creationId xmlns:a16="http://schemas.microsoft.com/office/drawing/2014/main" xmlns="" id="{DBCEBA50-942E-4DB1-B324-946FB1E82D43}"/>
+                <a16:creationId xmlns="" xmlns:a16="http://schemas.microsoft.com/office/drawing/2014/main" id="{DBCEBA50-942E-4DB1-B324-946FB1E82D43}"/>
               </a:ext>
             </a:extLst>
           </p:cNvPr>
@@ -9424,7 +9339,7 @@
           <p:cNvPr id="3" name="Content Placeholder 2">
             <a:extLst>
               <a:ext uri="{FF2B5EF4-FFF2-40B4-BE49-F238E27FC236}">
-                <a16:creationId xmlns:a16="http://schemas.microsoft.com/office/drawing/2014/main" xmlns="" id="{98231205-1800-4B1A-884F-6E40D9C14D5C}"/>
+                <a16:creationId xmlns="" xmlns:a16="http://schemas.microsoft.com/office/drawing/2014/main" id="{98231205-1800-4B1A-884F-6E40D9C14D5C}"/>
               </a:ext>
             </a:extLst>
           </p:cNvPr>
@@ -9556,7 +9471,7 @@
           <p:cNvPr id="4" name="Footer Placeholder 3">
             <a:extLst>
               <a:ext uri="{FF2B5EF4-FFF2-40B4-BE49-F238E27FC236}">
-                <a16:creationId xmlns:a16="http://schemas.microsoft.com/office/drawing/2014/main" xmlns="" id="{2E15989E-ECDE-45CD-B39F-7F4FD73F5425}"/>
+                <a16:creationId xmlns="" xmlns:a16="http://schemas.microsoft.com/office/drawing/2014/main" id="{2E15989E-ECDE-45CD-B39F-7F4FD73F5425}"/>
               </a:ext>
             </a:extLst>
           </p:cNvPr>
@@ -9574,7 +9489,7 @@
           <a:p>
             <a:r>
               <a:rPr lang="en-US" smtClean="0"/>
-              <a:t>Copyright 2017, EV3Lessons.com (Last Edit 8/24/2017)</a:t>
+              <a:t>Copyright 2017, EV3Lessons.com (Last Edit 8/26/2017)</a:t>
             </a:r>
             <a:endParaRPr lang="en-US" dirty="0"/>
           </a:p>
@@ -9585,7 +9500,7 @@
           <p:cNvPr id="5" name="Slide Number Placeholder 4">
             <a:extLst>
               <a:ext uri="{FF2B5EF4-FFF2-40B4-BE49-F238E27FC236}">
-                <a16:creationId xmlns:a16="http://schemas.microsoft.com/office/drawing/2014/main" xmlns="" id="{CCD6C2E4-F37A-4435-A7B0-41D792B4034A}"/>
+                <a16:creationId xmlns="" xmlns:a16="http://schemas.microsoft.com/office/drawing/2014/main" id="{CCD6C2E4-F37A-4435-A7B0-41D792B4034A}"/>
               </a:ext>
             </a:extLst>
           </p:cNvPr>
@@ -9755,7 +9670,7 @@
           <p:cNvPr id="2" name="Title 1">
             <a:extLst>
               <a:ext uri="{FF2B5EF4-FFF2-40B4-BE49-F238E27FC236}">
-                <a16:creationId xmlns:a16="http://schemas.microsoft.com/office/drawing/2014/main" xmlns="" id="{47A25CF5-9F86-4198-9EC7-93A314B8830C}"/>
+                <a16:creationId xmlns="" xmlns:a16="http://schemas.microsoft.com/office/drawing/2014/main" id="{47A25CF5-9F86-4198-9EC7-93A314B8830C}"/>
               </a:ext>
             </a:extLst>
           </p:cNvPr>
@@ -9784,7 +9699,7 @@
           <p:cNvPr id="3" name="Content Placeholder 2">
             <a:extLst>
               <a:ext uri="{FF2B5EF4-FFF2-40B4-BE49-F238E27FC236}">
-                <a16:creationId xmlns:a16="http://schemas.microsoft.com/office/drawing/2014/main" xmlns="" id="{D4E33461-F234-4C49-BFA0-1263FD135D72}"/>
+                <a16:creationId xmlns="" xmlns:a16="http://schemas.microsoft.com/office/drawing/2014/main" id="{D4E33461-F234-4C49-BFA0-1263FD135D72}"/>
               </a:ext>
             </a:extLst>
           </p:cNvPr>
@@ -9924,7 +9839,7 @@
           <p:cNvPr id="4" name="Footer Placeholder 3">
             <a:extLst>
               <a:ext uri="{FF2B5EF4-FFF2-40B4-BE49-F238E27FC236}">
-                <a16:creationId xmlns:a16="http://schemas.microsoft.com/office/drawing/2014/main" xmlns="" id="{D5E1D59F-36BD-488D-A776-C7FF8414F571}"/>
+                <a16:creationId xmlns="" xmlns:a16="http://schemas.microsoft.com/office/drawing/2014/main" id="{D5E1D59F-36BD-488D-A776-C7FF8414F571}"/>
               </a:ext>
             </a:extLst>
           </p:cNvPr>
@@ -9942,7 +9857,7 @@
           <a:p>
             <a:r>
               <a:rPr lang="en-US" smtClean="0"/>
-              <a:t>Copyright 2017, EV3Lessons.com (Last Edit 8/24/2017)</a:t>
+              <a:t>Copyright 2017, EV3Lessons.com (Last Edit 8/26/2017)</a:t>
             </a:r>
             <a:endParaRPr lang="en-US" dirty="0"/>
           </a:p>
@@ -9953,7 +9868,7 @@
           <p:cNvPr id="5" name="Slide Number Placeholder 4">
             <a:extLst>
               <a:ext uri="{FF2B5EF4-FFF2-40B4-BE49-F238E27FC236}">
-                <a16:creationId xmlns:a16="http://schemas.microsoft.com/office/drawing/2014/main" xmlns="" id="{F4A53D64-940D-4DFF-841B-B20659DF83DB}"/>
+                <a16:creationId xmlns="" xmlns:a16="http://schemas.microsoft.com/office/drawing/2014/main" id="{F4A53D64-940D-4DFF-841B-B20659DF83DB}"/>
               </a:ext>
             </a:extLst>
           </p:cNvPr>
@@ -10062,7 +9977,7 @@
           <p:cNvPr id="2" name="Title 1">
             <a:extLst>
               <a:ext uri="{FF2B5EF4-FFF2-40B4-BE49-F238E27FC236}">
-                <a16:creationId xmlns:a16="http://schemas.microsoft.com/office/drawing/2014/main" xmlns="" id="{07A36CC2-C84E-4916-AFE7-BB5B383DF5B6}"/>
+                <a16:creationId xmlns="" xmlns:a16="http://schemas.microsoft.com/office/drawing/2014/main" id="{07A36CC2-C84E-4916-AFE7-BB5B383DF5B6}"/>
               </a:ext>
             </a:extLst>
           </p:cNvPr>
@@ -10100,7 +10015,7 @@
           <p:cNvPr id="3" name="Content Placeholder 2">
             <a:extLst>
               <a:ext uri="{FF2B5EF4-FFF2-40B4-BE49-F238E27FC236}">
-                <a16:creationId xmlns:a16="http://schemas.microsoft.com/office/drawing/2014/main" xmlns="" id="{7F6C7466-3F26-4FA1-9E5D-A4EF3FD6186C}"/>
+                <a16:creationId xmlns="" xmlns:a16="http://schemas.microsoft.com/office/drawing/2014/main" id="{7F6C7466-3F26-4FA1-9E5D-A4EF3FD6186C}"/>
               </a:ext>
             </a:extLst>
           </p:cNvPr>
@@ -10153,7 +10068,7 @@
           <p:cNvPr id="4" name="Footer Placeholder 3">
             <a:extLst>
               <a:ext uri="{FF2B5EF4-FFF2-40B4-BE49-F238E27FC236}">
-                <a16:creationId xmlns:a16="http://schemas.microsoft.com/office/drawing/2014/main" xmlns="" id="{E6544574-9390-49C1-AA1C-7CA937955DB2}"/>
+                <a16:creationId xmlns="" xmlns:a16="http://schemas.microsoft.com/office/drawing/2014/main" id="{E6544574-9390-49C1-AA1C-7CA937955DB2}"/>
               </a:ext>
             </a:extLst>
           </p:cNvPr>
@@ -10171,7 +10086,7 @@
           <a:p>
             <a:r>
               <a:rPr lang="en-US" smtClean="0"/>
-              <a:t>Copyright 2017, EV3Lessons.com (Last Edit 8/24/2017)</a:t>
+              <a:t>Copyright 2017, EV3Lessons.com (Last Edit 8/26/2017)</a:t>
             </a:r>
             <a:endParaRPr lang="en-US" dirty="0"/>
           </a:p>
@@ -10182,7 +10097,7 @@
           <p:cNvPr id="5" name="Slide Number Placeholder 4">
             <a:extLst>
               <a:ext uri="{FF2B5EF4-FFF2-40B4-BE49-F238E27FC236}">
-                <a16:creationId xmlns:a16="http://schemas.microsoft.com/office/drawing/2014/main" xmlns="" id="{829BAB7C-EDCC-4247-B5C4-0EC8AADEC359}"/>
+                <a16:creationId xmlns="" xmlns:a16="http://schemas.microsoft.com/office/drawing/2014/main" id="{829BAB7C-EDCC-4247-B5C4-0EC8AADEC359}"/>
               </a:ext>
             </a:extLst>
           </p:cNvPr>
@@ -10211,7 +10126,7 @@
           <p:cNvPr id="6" name="Picture 5">
             <a:extLst>
               <a:ext uri="{FF2B5EF4-FFF2-40B4-BE49-F238E27FC236}">
-                <a16:creationId xmlns:a16="http://schemas.microsoft.com/office/drawing/2014/main" xmlns="" id="{F3B0337C-14F0-4454-BEAF-8E850F5216D1}"/>
+                <a16:creationId xmlns="" xmlns:a16="http://schemas.microsoft.com/office/drawing/2014/main" id="{F3B0337C-14F0-4454-BEAF-8E850F5216D1}"/>
               </a:ext>
             </a:extLst>
           </p:cNvPr>
@@ -10418,11 +10333,7 @@
             <a:pPr algn="ctr"/>
             <a:r>
               <a:rPr lang="en-US" dirty="0" smtClean="0"/>
-              <a:t>Innovative </a:t>
-            </a:r>
-            <a:r>
-              <a:rPr lang="en-US" dirty="0" smtClean="0"/>
-              <a:t>Solution</a:t>
+              <a:t>Innovative Solution</a:t>
             </a:r>
             <a:endParaRPr lang="en-US" dirty="0"/>
           </a:p>
@@ -10463,7 +10374,7 @@
           <p:cNvPr id="2" name="Title 1">
             <a:extLst>
               <a:ext uri="{FF2B5EF4-FFF2-40B4-BE49-F238E27FC236}">
-                <a16:creationId xmlns:a16="http://schemas.microsoft.com/office/drawing/2014/main" xmlns="" id="{18C6B2D6-210B-4784-BA87-0E92F3C174FB}"/>
+                <a16:creationId xmlns="" xmlns:a16="http://schemas.microsoft.com/office/drawing/2014/main" id="{18C6B2D6-210B-4784-BA87-0E92F3C174FB}"/>
               </a:ext>
             </a:extLst>
           </p:cNvPr>
@@ -10496,7 +10407,7 @@
           <p:cNvPr id="3" name="Content Placeholder 2">
             <a:extLst>
               <a:ext uri="{FF2B5EF4-FFF2-40B4-BE49-F238E27FC236}">
-                <a16:creationId xmlns:a16="http://schemas.microsoft.com/office/drawing/2014/main" xmlns="" id="{48E36AA5-28E3-4749-9659-61530C4E2F6E}"/>
+                <a16:creationId xmlns="" xmlns:a16="http://schemas.microsoft.com/office/drawing/2014/main" id="{48E36AA5-28E3-4749-9659-61530C4E2F6E}"/>
               </a:ext>
             </a:extLst>
           </p:cNvPr>
@@ -10622,7 +10533,7 @@
           <p:cNvPr id="4" name="Footer Placeholder 3">
             <a:extLst>
               <a:ext uri="{FF2B5EF4-FFF2-40B4-BE49-F238E27FC236}">
-                <a16:creationId xmlns:a16="http://schemas.microsoft.com/office/drawing/2014/main" xmlns="" id="{63C17151-E14B-42D6-B396-8A67316B7A7A}"/>
+                <a16:creationId xmlns="" xmlns:a16="http://schemas.microsoft.com/office/drawing/2014/main" id="{63C17151-E14B-42D6-B396-8A67316B7A7A}"/>
               </a:ext>
             </a:extLst>
           </p:cNvPr>
@@ -10640,7 +10551,7 @@
           <a:p>
             <a:r>
               <a:rPr lang="en-US" smtClean="0"/>
-              <a:t>Copyright 2017, EV3Lessons.com (Last Edit 8/24/2017)</a:t>
+              <a:t>Copyright 2017, EV3Lessons.com (Last Edit 8/26/2017)</a:t>
             </a:r>
             <a:endParaRPr lang="en-US" dirty="0"/>
           </a:p>
@@ -10651,7 +10562,7 @@
           <p:cNvPr id="5" name="Slide Number Placeholder 4">
             <a:extLst>
               <a:ext uri="{FF2B5EF4-FFF2-40B4-BE49-F238E27FC236}">
-                <a16:creationId xmlns:a16="http://schemas.microsoft.com/office/drawing/2014/main" xmlns="" id="{D2017726-AD16-4226-8A68-94C4EBD8825D}"/>
+                <a16:creationId xmlns="" xmlns:a16="http://schemas.microsoft.com/office/drawing/2014/main" id="{D2017726-AD16-4226-8A68-94C4EBD8825D}"/>
               </a:ext>
             </a:extLst>
           </p:cNvPr>

</xml_diff>